<commit_message>
Tilføjede nogle PP meta filer til gitignore, fordi det blev ved med at fejle
</commit_message>
<xml_diff>
--- a/Meeting_Anders_Isaac_21_10_24/Status.pptx
+++ b/Meeting_Anders_Isaac_21_10_24/Status.pptx
@@ -7,6 +7,9 @@
   <p:sldIdLst>
     <p:sldId id="256" r:id="rId2"/>
     <p:sldId id="257" r:id="rId3"/>
+    <p:sldId id="258" r:id="rId4"/>
+    <p:sldId id="259" r:id="rId5"/>
+    <p:sldId id="260" r:id="rId6"/>
   </p:sldIdLst>
   <p:sldSz cx="12192000" cy="6858000"/>
   <p:notesSz cx="6858000" cy="9144000"/>
@@ -105,6 +108,11 @@
       </a:defRPr>
     </a:lvl9pPr>
   </p:defaultTextStyle>
+  <p:extLst>
+    <p:ext uri="{EFAFB233-063F-42B5-8137-9DF3F51BA10A}">
+      <p15:sldGuideLst xmlns:p15="http://schemas.microsoft.com/office/powerpoint/2012/main"/>
+    </p:ext>
+  </p:extLst>
 </p:presentation>
 </file>
 
@@ -3470,7 +3478,7 @@
         </p:blipFill>
         <p:spPr>
           <a:xfrm>
-            <a:off x="955654" y="2715040"/>
+            <a:off x="955654" y="1614291"/>
             <a:ext cx="5140346" cy="2785874"/>
           </a:xfrm>
           <a:prstGeom prst="rect">
@@ -3506,7 +3514,7 @@
         </p:blipFill>
         <p:spPr>
           <a:xfrm>
-            <a:off x="6075044" y="2725102"/>
+            <a:off x="6075044" y="1624353"/>
             <a:ext cx="5222099" cy="2775812"/>
           </a:xfrm>
           <a:prstGeom prst="rect">
@@ -3533,7 +3541,7 @@
         </p:nvCxnSpPr>
         <p:spPr>
           <a:xfrm flipH="1">
-            <a:off x="10542557" y="4155924"/>
+            <a:off x="10542557" y="3055175"/>
             <a:ext cx="430243" cy="657662"/>
           </a:xfrm>
           <a:prstGeom prst="straightConnector1">
@@ -3558,10 +3566,891 @@
           </a:fontRef>
         </p:style>
       </p:cxnSp>
+      <p:sp>
+        <p:nvSpPr>
+          <p:cNvPr id="3" name="TextBox 2">
+            <a:extLst>
+              <a:ext uri="{FF2B5EF4-FFF2-40B4-BE49-F238E27FC236}">
+                <a16:creationId xmlns:a16="http://schemas.microsoft.com/office/drawing/2014/main" id="{4E6B840C-4DF9-1548-044F-01EFC09822F6}"/>
+              </a:ext>
+            </a:extLst>
+          </p:cNvPr>
+          <p:cNvSpPr txBox="1"/>
+          <p:nvPr/>
+        </p:nvSpPr>
+        <p:spPr>
+          <a:xfrm>
+            <a:off x="992406" y="4793016"/>
+            <a:ext cx="10985801" cy="646331"/>
+          </a:xfrm>
+          <a:prstGeom prst="rect">
+            <a:avLst/>
+          </a:prstGeom>
+          <a:noFill/>
+        </p:spPr>
+        <p:txBody>
+          <a:bodyPr wrap="square" rtlCol="0">
+            <a:spAutoFit/>
+          </a:bodyPr>
+          <a:lstStyle/>
+          <a:p>
+            <a:pPr marL="285750" indent="-285750">
+              <a:buFont typeface="Arial" panose="020B0604020202020204" pitchFamily="34" charset="0"/>
+              <a:buChar char="•"/>
+            </a:pPr>
+            <a:r>
+              <a:rPr lang="da-DK" dirty="0"/>
+              <a:t>Ikke så stor forskel.</a:t>
+            </a:r>
+          </a:p>
+          <a:p>
+            <a:pPr marL="285750" indent="-285750">
+              <a:buFont typeface="Arial" panose="020B0604020202020204" pitchFamily="34" charset="0"/>
+              <a:buChar char="•"/>
+            </a:pPr>
+            <a:r>
+              <a:rPr lang="da-DK" dirty="0"/>
+              <a:t>Den største forskel er </a:t>
+            </a:r>
+            <a:r>
+              <a:rPr lang="da-DK" dirty="0" err="1"/>
+              <a:t>attenuationsværdien</a:t>
+            </a:r>
+            <a:r>
+              <a:rPr lang="da-DK" dirty="0"/>
+              <a:t>.</a:t>
+            </a:r>
+          </a:p>
+        </p:txBody>
+      </p:sp>
     </p:spTree>
     <p:extLst>
       <p:ext uri="{BB962C8B-B14F-4D97-AF65-F5344CB8AC3E}">
         <p14:creationId xmlns:p14="http://schemas.microsoft.com/office/powerpoint/2010/main" val="2214402734"/>
+      </p:ext>
+    </p:extLst>
+  </p:cSld>
+  <p:clrMapOvr>
+    <a:masterClrMapping/>
+  </p:clrMapOvr>
+</p:sld>
+</file>
+
+<file path=ppt/slides/slide3.xml><?xml version="1.0" encoding="utf-8"?>
+<p:sld xmlns:a="http://schemas.openxmlformats.org/drawingml/2006/main" xmlns:r="http://schemas.openxmlformats.org/officeDocument/2006/relationships" xmlns:p="http://schemas.openxmlformats.org/presentationml/2006/main">
+  <p:cSld>
+    <p:spTree>
+      <p:nvGrpSpPr>
+        <p:cNvPr id="1" name=""/>
+        <p:cNvGrpSpPr/>
+        <p:nvPr/>
+      </p:nvGrpSpPr>
+      <p:grpSpPr>
+        <a:xfrm>
+          <a:off x="0" y="0"/>
+          <a:ext cx="0" cy="0"/>
+          <a:chOff x="0" y="0"/>
+          <a:chExt cx="0" cy="0"/>
+        </a:xfrm>
+      </p:grpSpPr>
+      <p:sp>
+        <p:nvSpPr>
+          <p:cNvPr id="2" name="Title 1">
+            <a:extLst>
+              <a:ext uri="{FF2B5EF4-FFF2-40B4-BE49-F238E27FC236}">
+                <a16:creationId xmlns:a16="http://schemas.microsoft.com/office/drawing/2014/main" id="{62D5C559-1A90-8DE0-FB4B-43E6671A179C}"/>
+              </a:ext>
+            </a:extLst>
+          </p:cNvPr>
+          <p:cNvSpPr>
+            <a:spLocks noGrp="1"/>
+          </p:cNvSpPr>
+          <p:nvPr>
+            <p:ph type="title"/>
+          </p:nvPr>
+        </p:nvSpPr>
+        <p:spPr/>
+        <p:txBody>
+          <a:bodyPr/>
+          <a:lstStyle/>
+          <a:p>
+            <a:r>
+              <a:rPr lang="da-DK" dirty="0" err="1"/>
+              <a:t>Decrease</a:t>
+            </a:r>
+            <a:r>
+              <a:rPr lang="da-DK" dirty="0"/>
+              <a:t> in </a:t>
+            </a:r>
+            <a:r>
+              <a:rPr lang="da-DK" dirty="0" err="1"/>
+              <a:t>attenution</a:t>
+            </a:r>
+            <a:r>
+              <a:rPr lang="da-DK" dirty="0"/>
+              <a:t> </a:t>
+            </a:r>
+            <a:r>
+              <a:rPr lang="da-DK" dirty="0" err="1"/>
+              <a:t>across</a:t>
+            </a:r>
+            <a:r>
+              <a:rPr lang="da-DK" dirty="0"/>
+              <a:t> files</a:t>
+            </a:r>
+          </a:p>
+        </p:txBody>
+      </p:sp>
+      <p:pic>
+        <p:nvPicPr>
+          <p:cNvPr id="4" name="Picture 3">
+            <a:extLst>
+              <a:ext uri="{FF2B5EF4-FFF2-40B4-BE49-F238E27FC236}">
+                <a16:creationId xmlns:a16="http://schemas.microsoft.com/office/drawing/2014/main" id="{DB5F7594-07D8-7FEC-DB0B-7D4666C17BB1}"/>
+              </a:ext>
+            </a:extLst>
+          </p:cNvPr>
+          <p:cNvPicPr>
+            <a:picLocks noChangeAspect="1"/>
+          </p:cNvPicPr>
+          <p:nvPr/>
+        </p:nvPicPr>
+        <p:blipFill>
+          <a:blip r:embed="rId2"/>
+          <a:stretch>
+            <a:fillRect/>
+          </a:stretch>
+        </p:blipFill>
+        <p:spPr>
+          <a:xfrm>
+            <a:off x="3601756" y="1434572"/>
+            <a:ext cx="4918199" cy="3761686"/>
+          </a:xfrm>
+          <a:prstGeom prst="rect">
+            <a:avLst/>
+          </a:prstGeom>
+        </p:spPr>
+      </p:pic>
+      <p:sp>
+        <p:nvSpPr>
+          <p:cNvPr id="5" name="TextBox 4">
+            <a:extLst>
+              <a:ext uri="{FF2B5EF4-FFF2-40B4-BE49-F238E27FC236}">
+                <a16:creationId xmlns:a16="http://schemas.microsoft.com/office/drawing/2014/main" id="{73E9FF6E-5045-725C-40EB-D0809501404C}"/>
+              </a:ext>
+            </a:extLst>
+          </p:cNvPr>
+          <p:cNvSpPr txBox="1"/>
+          <p:nvPr/>
+        </p:nvSpPr>
+        <p:spPr>
+          <a:xfrm>
+            <a:off x="888398" y="5330389"/>
+            <a:ext cx="10682446" cy="646331"/>
+          </a:xfrm>
+          <a:prstGeom prst="rect">
+            <a:avLst/>
+          </a:prstGeom>
+          <a:noFill/>
+        </p:spPr>
+        <p:txBody>
+          <a:bodyPr wrap="square" rtlCol="0">
+            <a:spAutoFit/>
+          </a:bodyPr>
+          <a:lstStyle/>
+          <a:p>
+            <a:r>
+              <a:rPr lang="da-DK" dirty="0" err="1"/>
+              <a:t>Why</a:t>
+            </a:r>
+            <a:r>
+              <a:rPr lang="da-DK" dirty="0"/>
+              <a:t>? And is it a problem? </a:t>
+            </a:r>
+            <a:r>
+              <a:rPr lang="da-DK" dirty="0" err="1"/>
+              <a:t>Maybe</a:t>
+            </a:r>
+            <a:r>
+              <a:rPr lang="da-DK" dirty="0"/>
+              <a:t> it </a:t>
+            </a:r>
+            <a:r>
+              <a:rPr lang="da-DK" dirty="0" err="1"/>
+              <a:t>makes</a:t>
+            </a:r>
+            <a:r>
+              <a:rPr lang="da-DK" dirty="0"/>
+              <a:t> the </a:t>
+            </a:r>
+            <a:r>
+              <a:rPr lang="da-DK" dirty="0" err="1"/>
+              <a:t>registration</a:t>
+            </a:r>
+            <a:r>
+              <a:rPr lang="da-DK" dirty="0"/>
+              <a:t> a </a:t>
+            </a:r>
+            <a:r>
+              <a:rPr lang="da-DK" dirty="0" err="1"/>
+              <a:t>little</a:t>
+            </a:r>
+            <a:r>
+              <a:rPr lang="da-DK" dirty="0"/>
+              <a:t> more </a:t>
+            </a:r>
+            <a:r>
+              <a:rPr lang="da-DK" dirty="0" err="1"/>
+              <a:t>difficult</a:t>
+            </a:r>
+            <a:r>
+              <a:rPr lang="da-DK" dirty="0"/>
+              <a:t>. I have </a:t>
+            </a:r>
+            <a:r>
+              <a:rPr lang="da-DK" dirty="0" err="1"/>
+              <a:t>tried</a:t>
+            </a:r>
+            <a:r>
+              <a:rPr lang="da-DK" dirty="0"/>
+              <a:t> to </a:t>
+            </a:r>
+            <a:r>
+              <a:rPr lang="da-DK" dirty="0" err="1"/>
+              <a:t>even</a:t>
+            </a:r>
+            <a:r>
+              <a:rPr lang="da-DK" dirty="0"/>
+              <a:t> out the difference but it </a:t>
+            </a:r>
+            <a:r>
+              <a:rPr lang="da-DK" dirty="0" err="1"/>
+              <a:t>cannot</a:t>
+            </a:r>
+            <a:r>
+              <a:rPr lang="da-DK" dirty="0"/>
+              <a:t> remake the </a:t>
+            </a:r>
+            <a:r>
+              <a:rPr lang="da-DK" dirty="0" err="1"/>
+              <a:t>exact</a:t>
+            </a:r>
+            <a:r>
+              <a:rPr lang="da-DK" dirty="0"/>
+              <a:t> same </a:t>
+            </a:r>
+            <a:r>
+              <a:rPr lang="da-DK" dirty="0" err="1"/>
+              <a:t>attenation</a:t>
+            </a:r>
+            <a:r>
+              <a:rPr lang="da-DK" dirty="0"/>
+              <a:t> </a:t>
+            </a:r>
+            <a:r>
+              <a:rPr lang="da-DK" dirty="0" err="1"/>
+              <a:t>values</a:t>
+            </a:r>
+            <a:r>
+              <a:rPr lang="da-DK" dirty="0"/>
+              <a:t> </a:t>
+            </a:r>
+            <a:r>
+              <a:rPr lang="da-DK" dirty="0" err="1"/>
+              <a:t>across</a:t>
+            </a:r>
+            <a:r>
+              <a:rPr lang="da-DK" dirty="0"/>
+              <a:t> the sample.</a:t>
+            </a:r>
+          </a:p>
+        </p:txBody>
+      </p:sp>
+    </p:spTree>
+    <p:extLst>
+      <p:ext uri="{BB962C8B-B14F-4D97-AF65-F5344CB8AC3E}">
+        <p14:creationId xmlns:p14="http://schemas.microsoft.com/office/powerpoint/2010/main" val="1874435720"/>
+      </p:ext>
+    </p:extLst>
+  </p:cSld>
+  <p:clrMapOvr>
+    <a:masterClrMapping/>
+  </p:clrMapOvr>
+</p:sld>
+</file>
+
+<file path=ppt/slides/slide4.xml><?xml version="1.0" encoding="utf-8"?>
+<p:sld xmlns:a="http://schemas.openxmlformats.org/drawingml/2006/main" xmlns:r="http://schemas.openxmlformats.org/officeDocument/2006/relationships" xmlns:p="http://schemas.openxmlformats.org/presentationml/2006/main">
+  <p:cSld>
+    <p:spTree>
+      <p:nvGrpSpPr>
+        <p:cNvPr id="1" name=""/>
+        <p:cNvGrpSpPr/>
+        <p:nvPr/>
+      </p:nvGrpSpPr>
+      <p:grpSpPr>
+        <a:xfrm>
+          <a:off x="0" y="0"/>
+          <a:ext cx="0" cy="0"/>
+          <a:chOff x="0" y="0"/>
+          <a:chExt cx="0" cy="0"/>
+        </a:xfrm>
+      </p:grpSpPr>
+      <p:sp>
+        <p:nvSpPr>
+          <p:cNvPr id="2" name="Title 1">
+            <a:extLst>
+              <a:ext uri="{FF2B5EF4-FFF2-40B4-BE49-F238E27FC236}">
+                <a16:creationId xmlns:a16="http://schemas.microsoft.com/office/drawing/2014/main" id="{1E8D2486-8F54-C5A9-97FE-31832440483D}"/>
+              </a:ext>
+            </a:extLst>
+          </p:cNvPr>
+          <p:cNvSpPr>
+            <a:spLocks noGrp="1"/>
+          </p:cNvSpPr>
+          <p:nvPr>
+            <p:ph type="title"/>
+          </p:nvPr>
+        </p:nvSpPr>
+        <p:spPr/>
+        <p:txBody>
+          <a:bodyPr/>
+          <a:lstStyle/>
+          <a:p>
+            <a:r>
+              <a:rPr lang="da-DK" dirty="0" err="1"/>
+              <a:t>Elastix</a:t>
+            </a:r>
+            <a:endParaRPr lang="da-DK" dirty="0"/>
+          </a:p>
+        </p:txBody>
+      </p:sp>
+      <p:sp>
+        <p:nvSpPr>
+          <p:cNvPr id="3" name="Content Placeholder 2">
+            <a:extLst>
+              <a:ext uri="{FF2B5EF4-FFF2-40B4-BE49-F238E27FC236}">
+                <a16:creationId xmlns:a16="http://schemas.microsoft.com/office/drawing/2014/main" id="{4CB12A8B-3DC9-5B88-BDED-92F195D146AF}"/>
+              </a:ext>
+            </a:extLst>
+          </p:cNvPr>
+          <p:cNvSpPr>
+            <a:spLocks noGrp="1"/>
+          </p:cNvSpPr>
+          <p:nvPr>
+            <p:ph idx="1"/>
+          </p:nvPr>
+        </p:nvSpPr>
+        <p:spPr/>
+        <p:txBody>
+          <a:bodyPr/>
+          <a:lstStyle/>
+          <a:p>
+            <a:pPr marL="0" indent="0">
+              <a:buNone/>
+            </a:pPr>
+            <a:r>
+              <a:rPr lang="da-DK" dirty="0"/>
+              <a:t>Air </a:t>
+            </a:r>
+            <a:r>
+              <a:rPr lang="da-DK" dirty="0" err="1"/>
+              <a:t>pocket</a:t>
+            </a:r>
+            <a:r>
+              <a:rPr lang="da-DK" dirty="0"/>
+              <a:t> in sample			</a:t>
+            </a:r>
+          </a:p>
+          <a:p>
+            <a:endParaRPr lang="da-DK" dirty="0"/>
+          </a:p>
+          <a:p>
+            <a:endParaRPr lang="da-DK" dirty="0"/>
+          </a:p>
+        </p:txBody>
+      </p:sp>
+      <p:pic>
+        <p:nvPicPr>
+          <p:cNvPr id="4" name="Picture 3">
+            <a:extLst>
+              <a:ext uri="{FF2B5EF4-FFF2-40B4-BE49-F238E27FC236}">
+                <a16:creationId xmlns:a16="http://schemas.microsoft.com/office/drawing/2014/main" id="{55F6B661-11B4-85D1-E23C-09B719D9A7F1}"/>
+              </a:ext>
+            </a:extLst>
+          </p:cNvPr>
+          <p:cNvPicPr>
+            <a:picLocks noChangeAspect="1"/>
+          </p:cNvPicPr>
+          <p:nvPr/>
+        </p:nvPicPr>
+        <p:blipFill>
+          <a:blip r:embed="rId2"/>
+          <a:stretch>
+            <a:fillRect/>
+          </a:stretch>
+        </p:blipFill>
+        <p:spPr>
+          <a:xfrm>
+            <a:off x="618888" y="2406994"/>
+            <a:ext cx="4176395" cy="2832735"/>
+          </a:xfrm>
+          <a:prstGeom prst="rect">
+            <a:avLst/>
+          </a:prstGeom>
+        </p:spPr>
+      </p:pic>
+      <p:pic>
+        <p:nvPicPr>
+          <p:cNvPr id="7" name="Picture 6">
+            <a:extLst>
+              <a:ext uri="{FF2B5EF4-FFF2-40B4-BE49-F238E27FC236}">
+                <a16:creationId xmlns:a16="http://schemas.microsoft.com/office/drawing/2014/main" id="{8815A2ED-4CB0-5711-48EA-D725579FE96D}"/>
+              </a:ext>
+            </a:extLst>
+          </p:cNvPr>
+          <p:cNvPicPr>
+            <a:picLocks noChangeAspect="1"/>
+          </p:cNvPicPr>
+          <p:nvPr/>
+        </p:nvPicPr>
+        <p:blipFill>
+          <a:blip r:embed="rId3"/>
+          <a:stretch>
+            <a:fillRect/>
+          </a:stretch>
+        </p:blipFill>
+        <p:spPr>
+          <a:xfrm>
+            <a:off x="5757948" y="2369879"/>
+            <a:ext cx="4176394" cy="2869850"/>
+          </a:xfrm>
+          <a:prstGeom prst="rect">
+            <a:avLst/>
+          </a:prstGeom>
+        </p:spPr>
+      </p:pic>
+      <p:sp>
+        <p:nvSpPr>
+          <p:cNvPr id="8" name="TextBox 7">
+            <a:extLst>
+              <a:ext uri="{FF2B5EF4-FFF2-40B4-BE49-F238E27FC236}">
+                <a16:creationId xmlns:a16="http://schemas.microsoft.com/office/drawing/2014/main" id="{CB196790-DCB7-F04E-2035-A5231B95E236}"/>
+              </a:ext>
+            </a:extLst>
+          </p:cNvPr>
+          <p:cNvSpPr txBox="1"/>
+          <p:nvPr/>
+        </p:nvSpPr>
+        <p:spPr>
+          <a:xfrm>
+            <a:off x="5757948" y="1551446"/>
+            <a:ext cx="4426128" cy="646331"/>
+          </a:xfrm>
+          <a:prstGeom prst="rect">
+            <a:avLst/>
+          </a:prstGeom>
+          <a:noFill/>
+        </p:spPr>
+        <p:txBody>
+          <a:bodyPr wrap="square" rtlCol="0">
+            <a:spAutoFit/>
+          </a:bodyPr>
+          <a:lstStyle/>
+          <a:p>
+            <a:r>
+              <a:rPr lang="da-DK" dirty="0"/>
+              <a:t>Difference image of same air </a:t>
+            </a:r>
+            <a:r>
+              <a:rPr lang="da-DK" dirty="0" err="1"/>
+              <a:t>pocked</a:t>
+            </a:r>
+            <a:r>
+              <a:rPr lang="da-DK" dirty="0"/>
+              <a:t> </a:t>
+            </a:r>
+            <a:r>
+              <a:rPr lang="da-DK" dirty="0" err="1"/>
+              <a:t>after</a:t>
+            </a:r>
+            <a:r>
+              <a:rPr lang="da-DK" dirty="0"/>
+              <a:t> </a:t>
+            </a:r>
+            <a:r>
+              <a:rPr lang="da-DK" dirty="0" err="1"/>
+              <a:t>registration</a:t>
+            </a:r>
+            <a:r>
+              <a:rPr lang="da-DK" dirty="0"/>
+              <a:t> (5 bar and 65 bar)</a:t>
+            </a:r>
+          </a:p>
+        </p:txBody>
+      </p:sp>
+    </p:spTree>
+    <p:extLst>
+      <p:ext uri="{BB962C8B-B14F-4D97-AF65-F5344CB8AC3E}">
+        <p14:creationId xmlns:p14="http://schemas.microsoft.com/office/powerpoint/2010/main" val="3769603448"/>
+      </p:ext>
+    </p:extLst>
+  </p:cSld>
+  <p:clrMapOvr>
+    <a:masterClrMapping/>
+  </p:clrMapOvr>
+</p:sld>
+</file>
+
+<file path=ppt/slides/slide5.xml><?xml version="1.0" encoding="utf-8"?>
+<p:sld xmlns:a="http://schemas.openxmlformats.org/drawingml/2006/main" xmlns:r="http://schemas.openxmlformats.org/officeDocument/2006/relationships" xmlns:p="http://schemas.openxmlformats.org/presentationml/2006/main">
+  <p:cSld>
+    <p:spTree>
+      <p:nvGrpSpPr>
+        <p:cNvPr id="1" name="">
+          <a:extLst>
+            <a:ext uri="{FF2B5EF4-FFF2-40B4-BE49-F238E27FC236}">
+              <a16:creationId xmlns:a16="http://schemas.microsoft.com/office/drawing/2014/main" id="{2BFED318-60E1-9816-BD4E-F972A634015E}"/>
+            </a:ext>
+          </a:extLst>
+        </p:cNvPr>
+        <p:cNvGrpSpPr/>
+        <p:nvPr/>
+      </p:nvGrpSpPr>
+      <p:grpSpPr>
+        <a:xfrm>
+          <a:off x="0" y="0"/>
+          <a:ext cx="0" cy="0"/>
+          <a:chOff x="0" y="0"/>
+          <a:chExt cx="0" cy="0"/>
+        </a:xfrm>
+      </p:grpSpPr>
+      <p:sp>
+        <p:nvSpPr>
+          <p:cNvPr id="2" name="Title 1">
+            <a:extLst>
+              <a:ext uri="{FF2B5EF4-FFF2-40B4-BE49-F238E27FC236}">
+                <a16:creationId xmlns:a16="http://schemas.microsoft.com/office/drawing/2014/main" id="{DBCDF056-A74D-DD5A-9EF6-9457A2D2CEE9}"/>
+              </a:ext>
+            </a:extLst>
+          </p:cNvPr>
+          <p:cNvSpPr>
+            <a:spLocks noGrp="1"/>
+          </p:cNvSpPr>
+          <p:nvPr>
+            <p:ph type="title"/>
+          </p:nvPr>
+        </p:nvSpPr>
+        <p:spPr/>
+        <p:txBody>
+          <a:bodyPr/>
+          <a:lstStyle/>
+          <a:p>
+            <a:r>
+              <a:rPr lang="da-DK" dirty="0" err="1"/>
+              <a:t>Elastix</a:t>
+            </a:r>
+            <a:endParaRPr lang="da-DK" dirty="0"/>
+          </a:p>
+        </p:txBody>
+      </p:sp>
+      <p:sp>
+        <p:nvSpPr>
+          <p:cNvPr id="3" name="Content Placeholder 2">
+            <a:extLst>
+              <a:ext uri="{FF2B5EF4-FFF2-40B4-BE49-F238E27FC236}">
+                <a16:creationId xmlns:a16="http://schemas.microsoft.com/office/drawing/2014/main" id="{4D99F271-6A96-28C9-97FE-9227F36125D9}"/>
+              </a:ext>
+            </a:extLst>
+          </p:cNvPr>
+          <p:cNvSpPr>
+            <a:spLocks noGrp="1"/>
+          </p:cNvSpPr>
+          <p:nvPr>
+            <p:ph idx="1"/>
+          </p:nvPr>
+        </p:nvSpPr>
+        <p:spPr/>
+        <p:txBody>
+          <a:bodyPr/>
+          <a:lstStyle/>
+          <a:p>
+            <a:pPr marL="0" indent="0">
+              <a:buNone/>
+            </a:pPr>
+            <a:r>
+              <a:rPr lang="da-DK" sz="2000" dirty="0" err="1"/>
+              <a:t>Sometimes</a:t>
+            </a:r>
+            <a:r>
+              <a:rPr lang="da-DK" sz="2000" dirty="0"/>
+              <a:t> </a:t>
+            </a:r>
+            <a:r>
+              <a:rPr lang="da-DK" sz="2000" dirty="0" err="1"/>
+              <a:t>elastix</a:t>
+            </a:r>
+            <a:r>
+              <a:rPr lang="da-DK" sz="2000" dirty="0"/>
+              <a:t> </a:t>
+            </a:r>
+            <a:r>
+              <a:rPr lang="da-DK" sz="2000" dirty="0" err="1"/>
+              <a:t>does</a:t>
+            </a:r>
+            <a:r>
+              <a:rPr lang="da-DK" sz="2000" dirty="0"/>
+              <a:t> not </a:t>
+            </a:r>
+            <a:r>
+              <a:rPr lang="da-DK" sz="2000" dirty="0" err="1"/>
+              <a:t>work</a:t>
+            </a:r>
+            <a:r>
+              <a:rPr lang="da-DK" sz="2000" dirty="0"/>
+              <a:t> </a:t>
+            </a:r>
+            <a:r>
+              <a:rPr lang="da-DK" sz="2000" dirty="0" err="1"/>
+              <a:t>too</a:t>
+            </a:r>
+            <a:r>
+              <a:rPr lang="da-DK" sz="2000" dirty="0"/>
+              <a:t> </a:t>
+            </a:r>
+            <a:r>
+              <a:rPr lang="da-DK" sz="2000" dirty="0" err="1"/>
+              <a:t>well</a:t>
+            </a:r>
+            <a:r>
+              <a:rPr lang="da-DK" sz="2000" dirty="0"/>
+              <a:t>. </a:t>
+            </a:r>
+            <a:r>
+              <a:rPr lang="da-DK" sz="2000" dirty="0" err="1"/>
+              <a:t>Especially</a:t>
+            </a:r>
+            <a:r>
+              <a:rPr lang="da-DK" sz="2000" dirty="0"/>
+              <a:t> on big images:</a:t>
+            </a:r>
+          </a:p>
+          <a:p>
+            <a:pPr marL="0" indent="0">
+              <a:buNone/>
+            </a:pPr>
+            <a:endParaRPr lang="da-DK" sz="2000" dirty="0"/>
+          </a:p>
+          <a:p>
+            <a:pPr marL="0" indent="0">
+              <a:buNone/>
+            </a:pPr>
+            <a:endParaRPr lang="da-DK" sz="2000" dirty="0"/>
+          </a:p>
+          <a:p>
+            <a:endParaRPr lang="da-DK" dirty="0"/>
+          </a:p>
+          <a:p>
+            <a:endParaRPr lang="da-DK" dirty="0"/>
+          </a:p>
+        </p:txBody>
+      </p:sp>
+      <p:pic>
+        <p:nvPicPr>
+          <p:cNvPr id="6" name="Picture 5">
+            <a:extLst>
+              <a:ext uri="{FF2B5EF4-FFF2-40B4-BE49-F238E27FC236}">
+                <a16:creationId xmlns:a16="http://schemas.microsoft.com/office/drawing/2014/main" id="{D420DAD7-F3E2-2649-F00A-4EB72E782E84}"/>
+              </a:ext>
+            </a:extLst>
+          </p:cNvPr>
+          <p:cNvPicPr>
+            <a:picLocks noChangeAspect="1"/>
+          </p:cNvPicPr>
+          <p:nvPr/>
+        </p:nvPicPr>
+        <p:blipFill>
+          <a:blip r:embed="rId2"/>
+          <a:stretch>
+            <a:fillRect/>
+          </a:stretch>
+        </p:blipFill>
+        <p:spPr>
+          <a:xfrm>
+            <a:off x="1678599" y="4289581"/>
+            <a:ext cx="3214092" cy="1649482"/>
+          </a:xfrm>
+          <a:prstGeom prst="rect">
+            <a:avLst/>
+          </a:prstGeom>
+        </p:spPr>
+      </p:pic>
+      <p:pic>
+        <p:nvPicPr>
+          <p:cNvPr id="10" name="Picture 9">
+            <a:extLst>
+              <a:ext uri="{FF2B5EF4-FFF2-40B4-BE49-F238E27FC236}">
+                <a16:creationId xmlns:a16="http://schemas.microsoft.com/office/drawing/2014/main" id="{A4A410D8-909D-DCF0-D5B5-243971A23475}"/>
+              </a:ext>
+            </a:extLst>
+          </p:cNvPr>
+          <p:cNvPicPr>
+            <a:picLocks noChangeAspect="1"/>
+          </p:cNvPicPr>
+          <p:nvPr/>
+        </p:nvPicPr>
+        <p:blipFill>
+          <a:blip r:embed="rId3"/>
+          <a:stretch>
+            <a:fillRect/>
+          </a:stretch>
+        </p:blipFill>
+        <p:spPr>
+          <a:xfrm>
+            <a:off x="1678599" y="2547433"/>
+            <a:ext cx="3214092" cy="1608829"/>
+          </a:xfrm>
+          <a:prstGeom prst="rect">
+            <a:avLst/>
+          </a:prstGeom>
+        </p:spPr>
+      </p:pic>
+      <p:sp>
+        <p:nvSpPr>
+          <p:cNvPr id="11" name="TextBox 10">
+            <a:extLst>
+              <a:ext uri="{FF2B5EF4-FFF2-40B4-BE49-F238E27FC236}">
+                <a16:creationId xmlns:a16="http://schemas.microsoft.com/office/drawing/2014/main" id="{F5A0756A-29CA-2ABD-6C3C-320B1EA86EFF}"/>
+              </a:ext>
+            </a:extLst>
+          </p:cNvPr>
+          <p:cNvSpPr txBox="1"/>
+          <p:nvPr/>
+        </p:nvSpPr>
+        <p:spPr>
+          <a:xfrm rot="16200000">
+            <a:off x="538591" y="3066522"/>
+            <a:ext cx="1067978" cy="369332"/>
+          </a:xfrm>
+          <a:prstGeom prst="rect">
+            <a:avLst/>
+          </a:prstGeom>
+          <a:noFill/>
+        </p:spPr>
+        <p:txBody>
+          <a:bodyPr wrap="square" rtlCol="0">
+            <a:spAutoFit/>
+          </a:bodyPr>
+          <a:lstStyle/>
+          <a:p>
+            <a:r>
+              <a:rPr lang="da-DK" dirty="0" err="1"/>
+              <a:t>Before</a:t>
+            </a:r>
+            <a:endParaRPr lang="da-DK" dirty="0"/>
+          </a:p>
+        </p:txBody>
+      </p:sp>
+      <p:sp>
+        <p:nvSpPr>
+          <p:cNvPr id="14" name="TextBox 13">
+            <a:extLst>
+              <a:ext uri="{FF2B5EF4-FFF2-40B4-BE49-F238E27FC236}">
+                <a16:creationId xmlns:a16="http://schemas.microsoft.com/office/drawing/2014/main" id="{4C739BB3-CA69-E669-1C8B-774AD2F242F0}"/>
+              </a:ext>
+            </a:extLst>
+          </p:cNvPr>
+          <p:cNvSpPr txBox="1"/>
+          <p:nvPr/>
+        </p:nvSpPr>
+        <p:spPr>
+          <a:xfrm rot="16200000">
+            <a:off x="538591" y="4744367"/>
+            <a:ext cx="1067978" cy="369332"/>
+          </a:xfrm>
+          <a:prstGeom prst="rect">
+            <a:avLst/>
+          </a:prstGeom>
+          <a:noFill/>
+        </p:spPr>
+        <p:txBody>
+          <a:bodyPr wrap="square" rtlCol="0">
+            <a:spAutoFit/>
+          </a:bodyPr>
+          <a:lstStyle/>
+          <a:p>
+            <a:r>
+              <a:rPr lang="da-DK" dirty="0" err="1"/>
+              <a:t>After</a:t>
+            </a:r>
+            <a:endParaRPr lang="da-DK" dirty="0"/>
+          </a:p>
+        </p:txBody>
+      </p:sp>
+      <p:pic>
+        <p:nvPicPr>
+          <p:cNvPr id="16" name="Picture 15">
+            <a:extLst>
+              <a:ext uri="{FF2B5EF4-FFF2-40B4-BE49-F238E27FC236}">
+                <a16:creationId xmlns:a16="http://schemas.microsoft.com/office/drawing/2014/main" id="{960E5B21-B6DF-D488-1022-05F7CC628A1D}"/>
+              </a:ext>
+            </a:extLst>
+          </p:cNvPr>
+          <p:cNvPicPr>
+            <a:picLocks noChangeAspect="1"/>
+          </p:cNvPicPr>
+          <p:nvPr/>
+        </p:nvPicPr>
+        <p:blipFill>
+          <a:blip r:embed="rId4"/>
+          <a:stretch>
+            <a:fillRect/>
+          </a:stretch>
+        </p:blipFill>
+        <p:spPr>
+          <a:xfrm>
+            <a:off x="6096000" y="4334496"/>
+            <a:ext cx="3248579" cy="1629858"/>
+          </a:xfrm>
+          <a:prstGeom prst="rect">
+            <a:avLst/>
+          </a:prstGeom>
+        </p:spPr>
+      </p:pic>
+      <p:pic>
+        <p:nvPicPr>
+          <p:cNvPr id="18" name="Picture 17">
+            <a:extLst>
+              <a:ext uri="{FF2B5EF4-FFF2-40B4-BE49-F238E27FC236}">
+                <a16:creationId xmlns:a16="http://schemas.microsoft.com/office/drawing/2014/main" id="{C5D457C7-1CB0-81A2-A432-95CC114537E3}"/>
+              </a:ext>
+            </a:extLst>
+          </p:cNvPr>
+          <p:cNvPicPr>
+            <a:picLocks noChangeAspect="1"/>
+          </p:cNvPicPr>
+          <p:nvPr/>
+        </p:nvPicPr>
+        <p:blipFill>
+          <a:blip r:embed="rId5"/>
+          <a:stretch>
+            <a:fillRect/>
+          </a:stretch>
+        </p:blipFill>
+        <p:spPr>
+          <a:xfrm>
+            <a:off x="6096000" y="2547433"/>
+            <a:ext cx="3138741" cy="1655439"/>
+          </a:xfrm>
+          <a:prstGeom prst="rect">
+            <a:avLst/>
+          </a:prstGeom>
+        </p:spPr>
+      </p:pic>
+    </p:spTree>
+    <p:extLst>
+      <p:ext uri="{BB962C8B-B14F-4D97-AF65-F5344CB8AC3E}">
+        <p14:creationId xmlns:p14="http://schemas.microsoft.com/office/powerpoint/2010/main" val="3464543584"/>
       </p:ext>
     </p:extLst>
   </p:cSld>

</xml_diff>